<commit_message>
found new attribute "Ctrtitle"
sldContent change to new Class instead of text type
</commit_message>
<xml_diff>
--- a/演示文稿2.pptx
+++ b/演示文稿2.pptx
@@ -244,7 +244,7 @@
           <a:p>
             <a:fld id="{3061FC46-4A4A-054B-8F30-7B28FA2F0C74}" type="datetimeFigureOut">
               <a:rPr kumimoji="1" lang="zh-CN" altLang="en-US" smtClean="0"/>
-              <a:t>16/4/12</a:t>
+              <a:t>16/4/21</a:t>
             </a:fld>
             <a:endParaRPr kumimoji="1" lang="zh-CN" altLang="en-US"/>
           </a:p>
@@ -414,7 +414,7 @@
           <a:p>
             <a:fld id="{3061FC46-4A4A-054B-8F30-7B28FA2F0C74}" type="datetimeFigureOut">
               <a:rPr kumimoji="1" lang="zh-CN" altLang="en-US" smtClean="0"/>
-              <a:t>16/4/12</a:t>
+              <a:t>16/4/21</a:t>
             </a:fld>
             <a:endParaRPr kumimoji="1" lang="zh-CN" altLang="en-US"/>
           </a:p>
@@ -594,7 +594,7 @@
           <a:p>
             <a:fld id="{3061FC46-4A4A-054B-8F30-7B28FA2F0C74}" type="datetimeFigureOut">
               <a:rPr kumimoji="1" lang="zh-CN" altLang="en-US" smtClean="0"/>
-              <a:t>16/4/12</a:t>
+              <a:t>16/4/21</a:t>
             </a:fld>
             <a:endParaRPr kumimoji="1" lang="zh-CN" altLang="en-US"/>
           </a:p>
@@ -764,7 +764,7 @@
           <a:p>
             <a:fld id="{3061FC46-4A4A-054B-8F30-7B28FA2F0C74}" type="datetimeFigureOut">
               <a:rPr kumimoji="1" lang="zh-CN" altLang="en-US" smtClean="0"/>
-              <a:t>16/4/12</a:t>
+              <a:t>16/4/21</a:t>
             </a:fld>
             <a:endParaRPr kumimoji="1" lang="zh-CN" altLang="en-US"/>
           </a:p>
@@ -1010,7 +1010,7 @@
           <a:p>
             <a:fld id="{3061FC46-4A4A-054B-8F30-7B28FA2F0C74}" type="datetimeFigureOut">
               <a:rPr kumimoji="1" lang="zh-CN" altLang="en-US" smtClean="0"/>
-              <a:t>16/4/12</a:t>
+              <a:t>16/4/21</a:t>
             </a:fld>
             <a:endParaRPr kumimoji="1" lang="zh-CN" altLang="en-US"/>
           </a:p>
@@ -1242,7 +1242,7 @@
           <a:p>
             <a:fld id="{3061FC46-4A4A-054B-8F30-7B28FA2F0C74}" type="datetimeFigureOut">
               <a:rPr kumimoji="1" lang="zh-CN" altLang="en-US" smtClean="0"/>
-              <a:t>16/4/12</a:t>
+              <a:t>16/4/21</a:t>
             </a:fld>
             <a:endParaRPr kumimoji="1" lang="zh-CN" altLang="en-US"/>
           </a:p>
@@ -1609,7 +1609,7 @@
           <a:p>
             <a:fld id="{3061FC46-4A4A-054B-8F30-7B28FA2F0C74}" type="datetimeFigureOut">
               <a:rPr kumimoji="1" lang="zh-CN" altLang="en-US" smtClean="0"/>
-              <a:t>16/4/12</a:t>
+              <a:t>16/4/21</a:t>
             </a:fld>
             <a:endParaRPr kumimoji="1" lang="zh-CN" altLang="en-US"/>
           </a:p>
@@ -1727,7 +1727,7 @@
           <a:p>
             <a:fld id="{3061FC46-4A4A-054B-8F30-7B28FA2F0C74}" type="datetimeFigureOut">
               <a:rPr kumimoji="1" lang="zh-CN" altLang="en-US" smtClean="0"/>
-              <a:t>16/4/12</a:t>
+              <a:t>16/4/21</a:t>
             </a:fld>
             <a:endParaRPr kumimoji="1" lang="zh-CN" altLang="en-US"/>
           </a:p>
@@ -1822,7 +1822,7 @@
           <a:p>
             <a:fld id="{3061FC46-4A4A-054B-8F30-7B28FA2F0C74}" type="datetimeFigureOut">
               <a:rPr kumimoji="1" lang="zh-CN" altLang="en-US" smtClean="0"/>
-              <a:t>16/4/12</a:t>
+              <a:t>16/4/21</a:t>
             </a:fld>
             <a:endParaRPr kumimoji="1" lang="zh-CN" altLang="en-US"/>
           </a:p>
@@ -2099,7 +2099,7 @@
           <a:p>
             <a:fld id="{3061FC46-4A4A-054B-8F30-7B28FA2F0C74}" type="datetimeFigureOut">
               <a:rPr kumimoji="1" lang="zh-CN" altLang="en-US" smtClean="0"/>
-              <a:t>16/4/12</a:t>
+              <a:t>16/4/21</a:t>
             </a:fld>
             <a:endParaRPr kumimoji="1" lang="zh-CN" altLang="en-US"/>
           </a:p>
@@ -2352,7 +2352,7 @@
           <a:p>
             <a:fld id="{3061FC46-4A4A-054B-8F30-7B28FA2F0C74}" type="datetimeFigureOut">
               <a:rPr kumimoji="1" lang="zh-CN" altLang="en-US" smtClean="0"/>
-              <a:t>16/4/12</a:t>
+              <a:t>16/4/21</a:t>
             </a:fld>
             <a:endParaRPr kumimoji="1" lang="zh-CN" altLang="en-US"/>
           </a:p>
@@ -2565,7 +2565,7 @@
           <a:p>
             <a:fld id="{3061FC46-4A4A-054B-8F30-7B28FA2F0C74}" type="datetimeFigureOut">
               <a:rPr kumimoji="1" lang="zh-CN" altLang="en-US" smtClean="0"/>
-              <a:t>16/4/12</a:t>
+              <a:t>16/4/21</a:t>
             </a:fld>
             <a:endParaRPr kumimoji="1" lang="zh-CN" altLang="en-US"/>
           </a:p>
@@ -3084,6 +3084,7 @@
           <a:bodyPr/>
           <a:lstStyle/>
           <a:p>
+            <a:pPr algn="r"/>
             <a:r>
               <a:rPr kumimoji="1" lang="en-US" altLang="zh-CN" dirty="0" smtClean="0"/>
               <a:t>123</a:t>
@@ -3108,10 +3109,10 @@
           <a:lstStyle/>
           <a:p>
             <a:r>
-              <a:rPr kumimoji="1" lang="en-US" altLang="zh-CN" smtClean="0"/>
+              <a:rPr kumimoji="1" lang="en-US" altLang="zh-CN" dirty="0" smtClean="0"/>
               <a:t>12312</a:t>
             </a:r>
-            <a:endParaRPr kumimoji="1" lang="zh-CN" altLang="en-US"/>
+            <a:endParaRPr kumimoji="1" lang="zh-CN" altLang="en-US" dirty="0"/>
           </a:p>
         </p:txBody>
       </p:sp>

</xml_diff>